<commit_message>
Inclusao Definicao do profisional da informacao
</commit_message>
<xml_diff>
--- a/Grupo_4_BIG_Data_Desafios_profissional_info.pptx
+++ b/Grupo_4_BIG_Data_Desafios_profissional_info.pptx
@@ -8,7 +8,11 @@
   <p:sldIdLst>
     <p:sldId id="256" r:id="rId3"/>
     <p:sldId id="257" r:id="rId4"/>
-    <p:sldId id="258" r:id="rId5"/>
+    <p:sldId id="259" r:id="rId5"/>
+    <p:sldId id="260" r:id="rId6"/>
+    <p:sldId id="261" r:id="rId7"/>
+    <p:sldId id="262" r:id="rId8"/>
+    <p:sldId id="258" r:id="rId9"/>
   </p:sldIdLst>
   <p:sldSz cx="12192000" cy="6858000"/>
   <p:notesSz cx="6858000" cy="9144000"/>
@@ -294,7 +298,7 @@
             <a:fld id="{E55760E3-C22B-A14E-97E4-6F8CD2528652}" type="datetimeFigureOut">
               <a:rPr lang="pt-BR" smtClean="0"/>
               <a:pPr/>
-              <a:t>29/01/2022</a:t>
+              <a:t>03/02/2022</a:t>
             </a:fld>
             <a:endParaRPr lang="pt-BR"/>
           </a:p>
@@ -484,7 +488,7 @@
           <a:p>
             <a:fld id="{E55760E3-C22B-A14E-97E4-6F8CD2528652}" type="datetimeFigureOut">
               <a:rPr lang="pt-BR" smtClean="0"/>
-              <a:t>29/01/2022</a:t>
+              <a:t>03/02/2022</a:t>
             </a:fld>
             <a:endParaRPr lang="pt-BR"/>
           </a:p>
@@ -667,7 +671,7 @@
           <a:p>
             <a:fld id="{E55760E3-C22B-A14E-97E4-6F8CD2528652}" type="datetimeFigureOut">
               <a:rPr lang="pt-BR" smtClean="0"/>
-              <a:t>29/01/2022</a:t>
+              <a:t>03/02/2022</a:t>
             </a:fld>
             <a:endParaRPr lang="pt-BR"/>
           </a:p>
@@ -919,7 +923,7 @@
             <a:fld id="{E55760E3-C22B-A14E-97E4-6F8CD2528652}" type="datetimeFigureOut">
               <a:rPr lang="pt-BR" smtClean="0"/>
               <a:pPr/>
-              <a:t>29/01/2022</a:t>
+              <a:t>03/02/2022</a:t>
             </a:fld>
             <a:endParaRPr lang="pt-BR"/>
           </a:p>
@@ -1109,7 +1113,7 @@
           <a:p>
             <a:fld id="{E55760E3-C22B-A14E-97E4-6F8CD2528652}" type="datetimeFigureOut">
               <a:rPr lang="pt-BR" smtClean="0"/>
-              <a:t>29/01/2022</a:t>
+              <a:t>03/02/2022</a:t>
             </a:fld>
             <a:endParaRPr lang="pt-BR"/>
           </a:p>
@@ -1387,7 +1391,7 @@
           <a:p>
             <a:fld id="{E55760E3-C22B-A14E-97E4-6F8CD2528652}" type="datetimeFigureOut">
               <a:rPr lang="pt-BR" smtClean="0"/>
-              <a:t>29/01/2022</a:t>
+              <a:t>03/02/2022</a:t>
             </a:fld>
             <a:endParaRPr lang="pt-BR"/>
           </a:p>
@@ -1602,7 +1606,7 @@
           <a:p>
             <a:fld id="{E55760E3-C22B-A14E-97E4-6F8CD2528652}" type="datetimeFigureOut">
               <a:rPr lang="pt-BR" smtClean="0"/>
-              <a:t>29/01/2022</a:t>
+              <a:t>03/02/2022</a:t>
             </a:fld>
             <a:endParaRPr lang="pt-BR"/>
           </a:p>
@@ -1822,7 +1826,7 @@
           <a:p>
             <a:fld id="{E55760E3-C22B-A14E-97E4-6F8CD2528652}" type="datetimeFigureOut">
               <a:rPr lang="pt-BR" smtClean="0"/>
-              <a:t>29/01/2022</a:t>
+              <a:t>03/02/2022</a:t>
             </a:fld>
             <a:endParaRPr lang="pt-BR"/>
           </a:p>
@@ -1963,7 +1967,7 @@
           <a:p>
             <a:fld id="{E55760E3-C22B-A14E-97E4-6F8CD2528652}" type="datetimeFigureOut">
               <a:rPr lang="pt-BR" smtClean="0"/>
-              <a:t>29/01/2022</a:t>
+              <a:t>03/02/2022</a:t>
             </a:fld>
             <a:endParaRPr lang="pt-BR"/>
           </a:p>
@@ -2076,7 +2080,7 @@
           <a:p>
             <a:fld id="{E55760E3-C22B-A14E-97E4-6F8CD2528652}" type="datetimeFigureOut">
               <a:rPr lang="pt-BR" smtClean="0"/>
-              <a:t>29/01/2022</a:t>
+              <a:t>03/02/2022</a:t>
             </a:fld>
             <a:endParaRPr lang="pt-BR"/>
           </a:p>
@@ -2365,7 +2369,7 @@
           <a:p>
             <a:fld id="{E55760E3-C22B-A14E-97E4-6F8CD2528652}" type="datetimeFigureOut">
               <a:rPr lang="pt-BR" smtClean="0"/>
-              <a:t>29/01/2022</a:t>
+              <a:t>03/02/2022</a:t>
             </a:fld>
             <a:endParaRPr lang="pt-BR"/>
           </a:p>
@@ -2538,7 +2542,7 @@
           <a:p>
             <a:fld id="{E55760E3-C22B-A14E-97E4-6F8CD2528652}" type="datetimeFigureOut">
               <a:rPr lang="pt-BR" smtClean="0"/>
-              <a:t>29/01/2022</a:t>
+              <a:t>03/02/2022</a:t>
             </a:fld>
             <a:endParaRPr lang="pt-BR"/>
           </a:p>
@@ -2829,7 +2833,7 @@
           <a:p>
             <a:fld id="{E55760E3-C22B-A14E-97E4-6F8CD2528652}" type="datetimeFigureOut">
               <a:rPr lang="pt-BR" smtClean="0"/>
-              <a:t>29/01/2022</a:t>
+              <a:t>03/02/2022</a:t>
             </a:fld>
             <a:endParaRPr lang="pt-BR"/>
           </a:p>
@@ -3002,7 +3006,7 @@
           <a:p>
             <a:fld id="{E55760E3-C22B-A14E-97E4-6F8CD2528652}" type="datetimeFigureOut">
               <a:rPr lang="pt-BR" smtClean="0"/>
-              <a:t>29/01/2022</a:t>
+              <a:t>03/02/2022</a:t>
             </a:fld>
             <a:endParaRPr lang="pt-BR"/>
           </a:p>
@@ -3185,7 +3189,7 @@
           <a:p>
             <a:fld id="{E55760E3-C22B-A14E-97E4-6F8CD2528652}" type="datetimeFigureOut">
               <a:rPr lang="pt-BR" smtClean="0"/>
-              <a:t>29/01/2022</a:t>
+              <a:t>03/02/2022</a:t>
             </a:fld>
             <a:endParaRPr lang="pt-BR"/>
           </a:p>
@@ -3463,7 +3467,7 @@
           <a:p>
             <a:fld id="{E55760E3-C22B-A14E-97E4-6F8CD2528652}" type="datetimeFigureOut">
               <a:rPr lang="pt-BR" smtClean="0"/>
-              <a:t>29/01/2022</a:t>
+              <a:t>03/02/2022</a:t>
             </a:fld>
             <a:endParaRPr lang="pt-BR"/>
           </a:p>
@@ -3678,7 +3682,7 @@
           <a:p>
             <a:fld id="{E55760E3-C22B-A14E-97E4-6F8CD2528652}" type="datetimeFigureOut">
               <a:rPr lang="pt-BR" smtClean="0"/>
-              <a:t>29/01/2022</a:t>
+              <a:t>03/02/2022</a:t>
             </a:fld>
             <a:endParaRPr lang="pt-BR"/>
           </a:p>
@@ -3898,7 +3902,7 @@
           <a:p>
             <a:fld id="{E55760E3-C22B-A14E-97E4-6F8CD2528652}" type="datetimeFigureOut">
               <a:rPr lang="pt-BR" smtClean="0"/>
-              <a:t>29/01/2022</a:t>
+              <a:t>03/02/2022</a:t>
             </a:fld>
             <a:endParaRPr lang="pt-BR"/>
           </a:p>
@@ -4039,7 +4043,7 @@
           <a:p>
             <a:fld id="{E55760E3-C22B-A14E-97E4-6F8CD2528652}" type="datetimeFigureOut">
               <a:rPr lang="pt-BR" smtClean="0"/>
-              <a:t>29/01/2022</a:t>
+              <a:t>03/02/2022</a:t>
             </a:fld>
             <a:endParaRPr lang="pt-BR"/>
           </a:p>
@@ -4152,7 +4156,7 @@
           <a:p>
             <a:fld id="{E55760E3-C22B-A14E-97E4-6F8CD2528652}" type="datetimeFigureOut">
               <a:rPr lang="pt-BR" smtClean="0"/>
-              <a:t>29/01/2022</a:t>
+              <a:t>03/02/2022</a:t>
             </a:fld>
             <a:endParaRPr lang="pt-BR"/>
           </a:p>
@@ -4441,7 +4445,7 @@
           <a:p>
             <a:fld id="{E55760E3-C22B-A14E-97E4-6F8CD2528652}" type="datetimeFigureOut">
               <a:rPr lang="pt-BR" smtClean="0"/>
-              <a:t>29/01/2022</a:t>
+              <a:t>03/02/2022</a:t>
             </a:fld>
             <a:endParaRPr lang="pt-BR"/>
           </a:p>
@@ -4732,7 +4736,7 @@
           <a:p>
             <a:fld id="{E55760E3-C22B-A14E-97E4-6F8CD2528652}" type="datetimeFigureOut">
               <a:rPr lang="pt-BR" smtClean="0"/>
-              <a:t>29/01/2022</a:t>
+              <a:t>03/02/2022</a:t>
             </a:fld>
             <a:endParaRPr lang="pt-BR"/>
           </a:p>
@@ -4957,7 +4961,7 @@
           <a:p>
             <a:fld id="{E55760E3-C22B-A14E-97E4-6F8CD2528652}" type="datetimeFigureOut">
               <a:rPr lang="pt-BR" smtClean="0"/>
-              <a:t>29/01/2022</a:t>
+              <a:t>03/02/2022</a:t>
             </a:fld>
             <a:endParaRPr lang="pt-BR"/>
           </a:p>
@@ -5513,7 +5517,7 @@
           <a:p>
             <a:fld id="{E55760E3-C22B-A14E-97E4-6F8CD2528652}" type="datetimeFigureOut">
               <a:rPr lang="pt-BR" smtClean="0"/>
-              <a:t>29/01/2022</a:t>
+              <a:t>03/02/2022</a:t>
             </a:fld>
             <a:endParaRPr lang="pt-BR"/>
           </a:p>
@@ -6114,45 +6118,161 @@
       </p:grpSpPr>
       <p:sp>
         <p:nvSpPr>
-          <p:cNvPr id="2" name="Título 1">
-            <a:extLst>
-              <a:ext uri="{FF2B5EF4-FFF2-40B4-BE49-F238E27FC236}">
-                <a16:creationId xmlns:a16="http://schemas.microsoft.com/office/drawing/2014/main" id="{E49A526B-B24E-4842-9D80-F65978770570}"/>
-              </a:ext>
-            </a:extLst>
-          </p:cNvPr>
-          <p:cNvSpPr>
-            <a:spLocks noGrp="1"/>
-          </p:cNvSpPr>
-          <p:nvPr>
-            <p:ph type="title"/>
-          </p:nvPr>
-        </p:nvSpPr>
-        <p:spPr/>
-        <p:txBody>
-          <a:bodyPr/>
-          <a:lstStyle/>
-          <a:p>
-            <a:r>
-              <a:rPr lang="pt-BR" dirty="0">
+          <p:cNvPr id="3" name="Espaço Reservado para Conteúdo 2">
+            <a:extLst>
+              <a:ext uri="{FF2B5EF4-FFF2-40B4-BE49-F238E27FC236}">
+                <a16:creationId xmlns:a16="http://schemas.microsoft.com/office/drawing/2014/main" id="{F74C072A-831B-45DE-AB42-D59E3F4EDC79}"/>
+              </a:ext>
+            </a:extLst>
+          </p:cNvPr>
+          <p:cNvSpPr>
+            <a:spLocks noGrp="1"/>
+          </p:cNvSpPr>
+          <p:nvPr>
+            <p:ph idx="1"/>
+          </p:nvPr>
+        </p:nvSpPr>
+        <p:spPr>
+          <a:xfrm>
+            <a:off x="-318053" y="1115603"/>
+            <a:ext cx="9687340" cy="1325563"/>
+          </a:xfrm>
+        </p:spPr>
+        <p:txBody>
+          <a:bodyPr>
+            <a:normAutofit/>
+          </a:bodyPr>
+          <a:lstStyle/>
+          <a:p>
+            <a:pPr marL="457200" lvl="1" indent="0">
+              <a:buNone/>
+            </a:pPr>
+            <a:r>
+              <a:rPr lang="pt-BR" sz="2000" dirty="0">
                 <a:solidFill>
                   <a:schemeClr val="accent1">
                     <a:lumMod val="50000"/>
                   </a:schemeClr>
                 </a:solidFill>
               </a:rPr>
-              <a:t>Pontos Para discutirmos no zap </a:t>
-            </a:r>
-            <a:r>
-              <a:rPr lang="pt-BR" dirty="0" err="1">
+              <a:t>O profissional da informação tem como </a:t>
+            </a:r>
+            <a:r>
+              <a:rPr lang="pt-BR" sz="2000" b="1" dirty="0">
                 <a:solidFill>
                   <a:schemeClr val="accent1">
                     <a:lumMod val="50000"/>
                   </a:schemeClr>
                 </a:solidFill>
               </a:rPr>
-              <a:t>dps</a:t>
-            </a:r>
+              <a:t>definição</a:t>
+            </a:r>
+            <a:r>
+              <a:rPr lang="pt-BR" sz="2000" dirty="0">
+                <a:solidFill>
+                  <a:schemeClr val="accent1">
+                    <a:lumMod val="50000"/>
+                  </a:schemeClr>
+                </a:solidFill>
+              </a:rPr>
+              <a:t> sentir a </a:t>
+            </a:r>
+            <a:r>
+              <a:rPr lang="pt-BR" sz="2000" b="1" dirty="0">
+                <a:solidFill>
+                  <a:srgbClr val="FF0000"/>
+                </a:solidFill>
+              </a:rPr>
+              <a:t>dor do cliente</a:t>
+            </a:r>
+            <a:r>
+              <a:rPr lang="pt-BR" sz="2000" dirty="0">
+                <a:solidFill>
+                  <a:schemeClr val="accent1">
+                    <a:lumMod val="50000"/>
+                  </a:schemeClr>
+                </a:solidFill>
+              </a:rPr>
+              <a:t> e diante as informações apresentadas e </a:t>
+            </a:r>
+            <a:r>
+              <a:rPr lang="pt-BR" sz="2000" b="1" dirty="0">
+                <a:solidFill>
+                  <a:schemeClr val="accent1">
+                    <a:lumMod val="50000"/>
+                  </a:schemeClr>
+                </a:solidFill>
+              </a:rPr>
+              <a:t>propor soluções</a:t>
+            </a:r>
+            <a:r>
+              <a:rPr lang="pt-BR" sz="2000" dirty="0">
+                <a:solidFill>
+                  <a:schemeClr val="accent1">
+                    <a:lumMod val="50000"/>
+                  </a:schemeClr>
+                </a:solidFill>
+              </a:rPr>
+              <a:t>, além de estar sempre em </a:t>
+            </a:r>
+            <a:r>
+              <a:rPr lang="pt-BR" sz="2000" b="1" dirty="0">
+                <a:solidFill>
+                  <a:schemeClr val="accent1">
+                    <a:lumMod val="50000"/>
+                  </a:schemeClr>
+                </a:solidFill>
+              </a:rPr>
+              <a:t>movimento</a:t>
+            </a:r>
+            <a:r>
+              <a:rPr lang="pt-BR" sz="2000" dirty="0">
+                <a:solidFill>
+                  <a:schemeClr val="accent1">
+                    <a:lumMod val="50000"/>
+                  </a:schemeClr>
+                </a:solidFill>
+              </a:rPr>
+              <a:t> buscando alternativas para </a:t>
+            </a:r>
+            <a:r>
+              <a:rPr lang="pt-BR" sz="2000" b="1" dirty="0">
+                <a:solidFill>
+                  <a:srgbClr val="FF0000"/>
+                </a:solidFill>
+              </a:rPr>
+              <a:t>resolver o problema</a:t>
+            </a:r>
+            <a:r>
+              <a:rPr lang="pt-BR" sz="2000" dirty="0">
+                <a:solidFill>
+                  <a:schemeClr val="accent1">
+                    <a:lumMod val="50000"/>
+                  </a:schemeClr>
+                </a:solidFill>
+              </a:rPr>
+              <a:t>.</a:t>
+            </a:r>
+          </a:p>
+          <a:p>
+            <a:pPr marL="457200" lvl="1" indent="0">
+              <a:buNone/>
+            </a:pPr>
+            <a:r>
+              <a:rPr lang="pt-BR" sz="2000" dirty="0">
+                <a:solidFill>
+                  <a:schemeClr val="accent1">
+                    <a:lumMod val="50000"/>
+                  </a:schemeClr>
+                </a:solidFill>
+              </a:rPr>
+              <a:t>Durante sua carreira o mesmo  irá exercer  algumas das atividades abaixo:</a:t>
+            </a:r>
+          </a:p>
+          <a:p>
+            <a:pPr marL="0" indent="0">
+              <a:buNone/>
+            </a:pPr>
             <a:endParaRPr lang="pt-BR" dirty="0">
               <a:solidFill>
                 <a:schemeClr val="accent1">
@@ -6165,46 +6285,285 @@
       </p:sp>
       <p:sp>
         <p:nvSpPr>
-          <p:cNvPr id="3" name="Espaço Reservado para Conteúdo 2">
-            <a:extLst>
-              <a:ext uri="{FF2B5EF4-FFF2-40B4-BE49-F238E27FC236}">
-                <a16:creationId xmlns:a16="http://schemas.microsoft.com/office/drawing/2014/main" id="{F74C072A-831B-45DE-AB42-D59E3F4EDC79}"/>
-              </a:ext>
-            </a:extLst>
-          </p:cNvPr>
-          <p:cNvSpPr>
-            <a:spLocks noGrp="1"/>
-          </p:cNvSpPr>
-          <p:nvPr>
-            <p:ph idx="1"/>
-          </p:nvPr>
-        </p:nvSpPr>
-        <p:spPr/>
-        <p:txBody>
-          <a:bodyPr/>
-          <a:lstStyle/>
-          <a:p>
-            <a:r>
-              <a:rPr lang="pt-BR" dirty="0">
+          <p:cNvPr id="5" name="Título 4">
+            <a:extLst>
+              <a:ext uri="{FF2B5EF4-FFF2-40B4-BE49-F238E27FC236}">
+                <a16:creationId xmlns:a16="http://schemas.microsoft.com/office/drawing/2014/main" id="{0AEB8621-39CA-4DB2-A51C-F33804404CE5}"/>
+              </a:ext>
+            </a:extLst>
+          </p:cNvPr>
+          <p:cNvSpPr>
+            <a:spLocks noGrp="1"/>
+          </p:cNvSpPr>
+          <p:nvPr>
+            <p:ph type="title"/>
+          </p:nvPr>
+        </p:nvSpPr>
+        <p:spPr>
+          <a:xfrm>
+            <a:off x="0" y="-21502"/>
+            <a:ext cx="10515600" cy="1325563"/>
+          </a:xfrm>
+        </p:spPr>
+        <p:txBody>
+          <a:bodyPr>
+            <a:normAutofit/>
+          </a:bodyPr>
+          <a:lstStyle/>
+          <a:p>
+            <a:r>
+              <a:rPr lang="pt-BR" sz="3200" dirty="0"/>
+              <a:t>DEFINIÇÃO DO PROFISSIONAL DA INFORMAÇÃO</a:t>
+            </a:r>
+          </a:p>
+        </p:txBody>
+      </p:sp>
+      <p:sp>
+        <p:nvSpPr>
+          <p:cNvPr id="7" name="CaixaDeTexto 6">
+            <a:extLst>
+              <a:ext uri="{FF2B5EF4-FFF2-40B4-BE49-F238E27FC236}">
+                <a16:creationId xmlns:a16="http://schemas.microsoft.com/office/drawing/2014/main" id="{60CD02A5-DA8A-45BE-9310-34C21B4B40B8}"/>
+              </a:ext>
+            </a:extLst>
+          </p:cNvPr>
+          <p:cNvSpPr txBox="1"/>
+          <p:nvPr/>
+        </p:nvSpPr>
+        <p:spPr>
+          <a:xfrm>
+            <a:off x="1179444" y="2926574"/>
+            <a:ext cx="10880035" cy="3785652"/>
+          </a:xfrm>
+          <a:prstGeom prst="rect">
+            <a:avLst/>
+          </a:prstGeom>
+          <a:noFill/>
+        </p:spPr>
+        <p:txBody>
+          <a:bodyPr wrap="square">
+            <a:spAutoFit/>
+          </a:bodyPr>
+          <a:lstStyle/>
+          <a:p>
+            <a:pPr marL="285750" indent="-285750">
+              <a:buFont typeface="Arial" panose="020B0604020202020204" pitchFamily="34" charset="0"/>
+              <a:buChar char="•"/>
+            </a:pPr>
+            <a:r>
+              <a:rPr lang="pt-BR" sz="2000" b="1" dirty="0">
                 <a:solidFill>
                   <a:schemeClr val="accent1">
                     <a:lumMod val="50000"/>
                   </a:schemeClr>
                 </a:solidFill>
               </a:rPr>
-              <a:t>Dificuldade das empresas de pequeno e grande porte de realizar a migração do B.I Para o BIG Data.</a:t>
-            </a:r>
-          </a:p>
-          <a:p>
-            <a:r>
-              <a:rPr lang="pt-BR" dirty="0">
+              <a:t>Realizar</a:t>
+            </a:r>
+            <a:r>
+              <a:rPr lang="pt-BR" sz="2000" dirty="0">
                 <a:solidFill>
                   <a:schemeClr val="accent1">
                     <a:lumMod val="50000"/>
                   </a:schemeClr>
                 </a:solidFill>
               </a:rPr>
-              <a:t>Dificuldade referente a mão de Obra qualificada para o Big Data.</a:t>
+              <a:t> reuniões com os clientes para planejar / ajustar o projeto.</a:t>
+            </a:r>
+          </a:p>
+          <a:p>
+            <a:pPr marL="285750" indent="-285750">
+              <a:buFont typeface="Arial" panose="020B0604020202020204" pitchFamily="34" charset="0"/>
+              <a:buChar char="•"/>
+            </a:pPr>
+            <a:endParaRPr lang="pt-BR" sz="2000" dirty="0">
+              <a:solidFill>
+                <a:schemeClr val="accent1">
+                  <a:lumMod val="50000"/>
+                </a:schemeClr>
+              </a:solidFill>
+            </a:endParaRPr>
+          </a:p>
+          <a:p>
+            <a:pPr marL="285750" indent="-285750">
+              <a:buFont typeface="Arial" panose="020B0604020202020204" pitchFamily="34" charset="0"/>
+              <a:buChar char="•"/>
+            </a:pPr>
+            <a:r>
+              <a:rPr lang="pt-BR" sz="2000" b="1" dirty="0">
+                <a:solidFill>
+                  <a:schemeClr val="accent1">
+                    <a:lumMod val="50000"/>
+                  </a:schemeClr>
+                </a:solidFill>
+              </a:rPr>
+              <a:t>Coletar</a:t>
+            </a:r>
+            <a:r>
+              <a:rPr lang="pt-BR" sz="2000" dirty="0">
+                <a:solidFill>
+                  <a:schemeClr val="accent1">
+                    <a:lumMod val="50000"/>
+                  </a:schemeClr>
+                </a:solidFill>
+              </a:rPr>
+              <a:t> todos as dados e validar se são suficientes e se estão adequadas para a utilização.</a:t>
+            </a:r>
+          </a:p>
+          <a:p>
+            <a:pPr marL="285750" indent="-285750">
+              <a:buFont typeface="Arial" panose="020B0604020202020204" pitchFamily="34" charset="0"/>
+              <a:buChar char="•"/>
+            </a:pPr>
+            <a:endParaRPr lang="pt-BR" sz="2000" dirty="0">
+              <a:solidFill>
+                <a:schemeClr val="accent1">
+                  <a:lumMod val="50000"/>
+                </a:schemeClr>
+              </a:solidFill>
+            </a:endParaRPr>
+          </a:p>
+          <a:p>
+            <a:pPr marL="285750" indent="-285750">
+              <a:buFont typeface="Arial" panose="020B0604020202020204" pitchFamily="34" charset="0"/>
+              <a:buChar char="•"/>
+            </a:pPr>
+            <a:r>
+              <a:rPr lang="pt-BR" sz="2000" b="1" dirty="0">
+                <a:solidFill>
+                  <a:schemeClr val="accent1">
+                    <a:lumMod val="50000"/>
+                  </a:schemeClr>
+                </a:solidFill>
+              </a:rPr>
+              <a:t>Analisar</a:t>
+            </a:r>
+            <a:r>
+              <a:rPr lang="pt-BR" sz="2000" dirty="0">
+                <a:solidFill>
+                  <a:schemeClr val="accent1">
+                    <a:lumMod val="50000"/>
+                  </a:schemeClr>
+                </a:solidFill>
+              </a:rPr>
+              <a:t> se as regras de negócios estão de acordo com o escopo inicial do projeto.</a:t>
+            </a:r>
+          </a:p>
+          <a:p>
+            <a:pPr marL="285750" indent="-285750">
+              <a:buFont typeface="Arial" panose="020B0604020202020204" pitchFamily="34" charset="0"/>
+              <a:buChar char="•"/>
+            </a:pPr>
+            <a:endParaRPr lang="pt-BR" sz="2000" dirty="0">
+              <a:solidFill>
+                <a:schemeClr val="accent1">
+                  <a:lumMod val="50000"/>
+                </a:schemeClr>
+              </a:solidFill>
+            </a:endParaRPr>
+          </a:p>
+          <a:p>
+            <a:pPr marL="285750" indent="-285750">
+              <a:buFont typeface="Arial" panose="020B0604020202020204" pitchFamily="34" charset="0"/>
+              <a:buChar char="•"/>
+            </a:pPr>
+            <a:r>
+              <a:rPr lang="pt-BR" sz="2000" b="1" dirty="0">
+                <a:solidFill>
+                  <a:schemeClr val="accent1">
+                    <a:lumMod val="50000"/>
+                  </a:schemeClr>
+                </a:solidFill>
+              </a:rPr>
+              <a:t>Construir </a:t>
+            </a:r>
+            <a:r>
+              <a:rPr lang="pt-BR" sz="2000" dirty="0">
+                <a:solidFill>
+                  <a:schemeClr val="accent1">
+                    <a:lumMod val="50000"/>
+                  </a:schemeClr>
+                </a:solidFill>
+              </a:rPr>
+              <a:t>o produto com as regras de negócios pré-definidas.</a:t>
+            </a:r>
+          </a:p>
+          <a:p>
+            <a:pPr marL="285750" indent="-285750">
+              <a:buFont typeface="Arial" panose="020B0604020202020204" pitchFamily="34" charset="0"/>
+              <a:buChar char="•"/>
+            </a:pPr>
+            <a:endParaRPr lang="pt-BR" sz="2000" dirty="0">
+              <a:solidFill>
+                <a:schemeClr val="accent1">
+                  <a:lumMod val="50000"/>
+                </a:schemeClr>
+              </a:solidFill>
+            </a:endParaRPr>
+          </a:p>
+          <a:p>
+            <a:pPr marL="285750" indent="-285750">
+              <a:buFont typeface="Arial" panose="020B0604020202020204" pitchFamily="34" charset="0"/>
+              <a:buChar char="•"/>
+            </a:pPr>
+            <a:r>
+              <a:rPr lang="pt-BR" sz="2000" b="1" dirty="0">
+                <a:solidFill>
+                  <a:schemeClr val="accent1">
+                    <a:lumMod val="50000"/>
+                  </a:schemeClr>
+                </a:solidFill>
+              </a:rPr>
+              <a:t>Gerenciar</a:t>
+            </a:r>
+            <a:r>
+              <a:rPr lang="pt-BR" sz="2000" dirty="0">
+                <a:solidFill>
+                  <a:schemeClr val="accent1">
+                    <a:lumMod val="50000"/>
+                  </a:schemeClr>
+                </a:solidFill>
+              </a:rPr>
+              <a:t> a equipe e/ou  projeto desenvolvido.</a:t>
+            </a:r>
+          </a:p>
+          <a:p>
+            <a:pPr marL="285750" indent="-285750">
+              <a:buFont typeface="Arial" panose="020B0604020202020204" pitchFamily="34" charset="0"/>
+              <a:buChar char="•"/>
+            </a:pPr>
+            <a:endParaRPr lang="pt-BR" sz="2000" dirty="0">
+              <a:solidFill>
+                <a:schemeClr val="accent1">
+                  <a:lumMod val="50000"/>
+                </a:schemeClr>
+              </a:solidFill>
+            </a:endParaRPr>
+          </a:p>
+          <a:p>
+            <a:pPr marL="285750" indent="-285750">
+              <a:buFont typeface="Arial" panose="020B0604020202020204" pitchFamily="34" charset="0"/>
+              <a:buChar char="•"/>
+            </a:pPr>
+            <a:r>
+              <a:rPr lang="pt-BR" sz="2000" b="1" dirty="0">
+                <a:solidFill>
+                  <a:schemeClr val="accent1">
+                    <a:lumMod val="50000"/>
+                  </a:schemeClr>
+                </a:solidFill>
+              </a:rPr>
+              <a:t>Buscar</a:t>
+            </a:r>
+            <a:r>
+              <a:rPr lang="pt-BR" sz="2000" dirty="0">
+                <a:solidFill>
+                  <a:schemeClr val="accent1">
+                    <a:lumMod val="50000"/>
+                  </a:schemeClr>
+                </a:solidFill>
+              </a:rPr>
+              <a:t> novos recursos / soluções constantemente com objetivo de ter mais de 1 opção para resolver o mesmo problema e definir qual a melhor.</a:t>
             </a:r>
           </a:p>
         </p:txBody>
@@ -6244,7 +6603,7 @@
           <p:cNvPr id="2" name="Título 1">
             <a:extLst>
               <a:ext uri="{FF2B5EF4-FFF2-40B4-BE49-F238E27FC236}">
-                <a16:creationId xmlns:a16="http://schemas.microsoft.com/office/drawing/2014/main" id="{8948CA21-0D4B-4A10-BB70-7E2F0A9B4055}"/>
+                <a16:creationId xmlns:a16="http://schemas.microsoft.com/office/drawing/2014/main" id="{D46C5F86-371D-400E-9D24-5CB1F79580B1}"/>
               </a:ext>
             </a:extLst>
           </p:cNvPr>
@@ -6257,22 +6616,432 @@
         </p:nvSpPr>
         <p:spPr>
           <a:xfrm>
-            <a:off x="178902" y="-212209"/>
+            <a:off x="0" y="0"/>
             <a:ext cx="10515600" cy="1325563"/>
           </a:xfrm>
         </p:spPr>
         <p:txBody>
-          <a:bodyPr/>
-          <a:lstStyle/>
-          <a:p>
-            <a:r>
-              <a:rPr lang="pt-BR" dirty="0">
+          <a:bodyPr>
+            <a:normAutofit/>
+          </a:bodyPr>
+          <a:lstStyle/>
+          <a:p>
+            <a:r>
+              <a:rPr lang="pt-BR" sz="3200" dirty="0"/>
+              <a:t>EVOLUÇÃO DO PROFISSIONAL DA INFORMAÇÃO</a:t>
+            </a:r>
+          </a:p>
+        </p:txBody>
+      </p:sp>
+      <p:sp>
+        <p:nvSpPr>
+          <p:cNvPr id="3" name="Espaço Reservado para Conteúdo 2">
+            <a:extLst>
+              <a:ext uri="{FF2B5EF4-FFF2-40B4-BE49-F238E27FC236}">
+                <a16:creationId xmlns:a16="http://schemas.microsoft.com/office/drawing/2014/main" id="{35974404-6F53-4081-B2C2-3E578FA0321A}"/>
+              </a:ext>
+            </a:extLst>
+          </p:cNvPr>
+          <p:cNvSpPr>
+            <a:spLocks noGrp="1"/>
+          </p:cNvSpPr>
+          <p:nvPr>
+            <p:ph idx="1"/>
+          </p:nvPr>
+        </p:nvSpPr>
+        <p:spPr/>
+        <p:txBody>
+          <a:bodyPr/>
+          <a:lstStyle/>
+          <a:p>
+            <a:endParaRPr lang="pt-BR" dirty="0"/>
+          </a:p>
+        </p:txBody>
+      </p:sp>
+    </p:spTree>
+    <p:extLst>
+      <p:ext uri="{BB962C8B-B14F-4D97-AF65-F5344CB8AC3E}">
+        <p14:creationId xmlns:p14="http://schemas.microsoft.com/office/powerpoint/2010/main" val="2721747945"/>
+      </p:ext>
+    </p:extLst>
+  </p:cSld>
+  <p:clrMapOvr>
+    <a:masterClrMapping/>
+  </p:clrMapOvr>
+</p:sld>
+</file>
+
+<file path=ppt/slides/slide4.xml><?xml version="1.0" encoding="utf-8"?>
+<p:sld xmlns:a="http://schemas.openxmlformats.org/drawingml/2006/main" xmlns:r="http://schemas.openxmlformats.org/officeDocument/2006/relationships" xmlns:p="http://schemas.openxmlformats.org/presentationml/2006/main">
+  <p:cSld>
+    <p:spTree>
+      <p:nvGrpSpPr>
+        <p:cNvPr id="1" name=""/>
+        <p:cNvGrpSpPr/>
+        <p:nvPr/>
+      </p:nvGrpSpPr>
+      <p:grpSpPr>
+        <a:xfrm>
+          <a:off x="0" y="0"/>
+          <a:ext cx="0" cy="0"/>
+          <a:chOff x="0" y="0"/>
+          <a:chExt cx="0" cy="0"/>
+        </a:xfrm>
+      </p:grpSpPr>
+      <p:sp>
+        <p:nvSpPr>
+          <p:cNvPr id="2" name="Título 1">
+            <a:extLst>
+              <a:ext uri="{FF2B5EF4-FFF2-40B4-BE49-F238E27FC236}">
+                <a16:creationId xmlns:a16="http://schemas.microsoft.com/office/drawing/2014/main" id="{C20C0728-2FDA-4ECD-92F2-DD81AEF5C5FD}"/>
+              </a:ext>
+            </a:extLst>
+          </p:cNvPr>
+          <p:cNvSpPr>
+            <a:spLocks noGrp="1"/>
+          </p:cNvSpPr>
+          <p:nvPr>
+            <p:ph type="title"/>
+          </p:nvPr>
+        </p:nvSpPr>
+        <p:spPr>
+          <a:xfrm>
+            <a:off x="0" y="20568"/>
+            <a:ext cx="10515600" cy="1325563"/>
+          </a:xfrm>
+        </p:spPr>
+        <p:txBody>
+          <a:bodyPr>
+            <a:normAutofit/>
+          </a:bodyPr>
+          <a:lstStyle/>
+          <a:p>
+            <a:r>
+              <a:rPr lang="pt-BR" sz="3200" dirty="0"/>
+              <a:t>O QUE É  BIG DATA?</a:t>
+            </a:r>
+          </a:p>
+        </p:txBody>
+      </p:sp>
+      <p:sp>
+        <p:nvSpPr>
+          <p:cNvPr id="3" name="Espaço Reservado para Conteúdo 2">
+            <a:extLst>
+              <a:ext uri="{FF2B5EF4-FFF2-40B4-BE49-F238E27FC236}">
+                <a16:creationId xmlns:a16="http://schemas.microsoft.com/office/drawing/2014/main" id="{B4EC6A67-34F1-4C38-9A94-E728CF77504D}"/>
+              </a:ext>
+            </a:extLst>
+          </p:cNvPr>
+          <p:cNvSpPr>
+            <a:spLocks noGrp="1"/>
+          </p:cNvSpPr>
+          <p:nvPr>
+            <p:ph idx="1"/>
+          </p:nvPr>
+        </p:nvSpPr>
+        <p:spPr/>
+        <p:txBody>
+          <a:bodyPr/>
+          <a:lstStyle/>
+          <a:p>
+            <a:endParaRPr lang="pt-BR"/>
+          </a:p>
+        </p:txBody>
+      </p:sp>
+    </p:spTree>
+    <p:extLst>
+      <p:ext uri="{BB962C8B-B14F-4D97-AF65-F5344CB8AC3E}">
+        <p14:creationId xmlns:p14="http://schemas.microsoft.com/office/powerpoint/2010/main" val="3767337992"/>
+      </p:ext>
+    </p:extLst>
+  </p:cSld>
+  <p:clrMapOvr>
+    <a:masterClrMapping/>
+  </p:clrMapOvr>
+</p:sld>
+</file>
+
+<file path=ppt/slides/slide5.xml><?xml version="1.0" encoding="utf-8"?>
+<p:sld xmlns:a="http://schemas.openxmlformats.org/drawingml/2006/main" xmlns:r="http://schemas.openxmlformats.org/officeDocument/2006/relationships" xmlns:p="http://schemas.openxmlformats.org/presentationml/2006/main">
+  <p:cSld>
+    <p:spTree>
+      <p:nvGrpSpPr>
+        <p:cNvPr id="1" name=""/>
+        <p:cNvGrpSpPr/>
+        <p:nvPr/>
+      </p:nvGrpSpPr>
+      <p:grpSpPr>
+        <a:xfrm>
+          <a:off x="0" y="0"/>
+          <a:ext cx="0" cy="0"/>
+          <a:chOff x="0" y="0"/>
+          <a:chExt cx="0" cy="0"/>
+        </a:xfrm>
+      </p:grpSpPr>
+      <p:sp>
+        <p:nvSpPr>
+          <p:cNvPr id="2" name="Título 1">
+            <a:extLst>
+              <a:ext uri="{FF2B5EF4-FFF2-40B4-BE49-F238E27FC236}">
+                <a16:creationId xmlns:a16="http://schemas.microsoft.com/office/drawing/2014/main" id="{5BCA60D6-6509-4316-819E-4D764DDA4392}"/>
+              </a:ext>
+            </a:extLst>
+          </p:cNvPr>
+          <p:cNvSpPr>
+            <a:spLocks noGrp="1"/>
+          </p:cNvSpPr>
+          <p:nvPr>
+            <p:ph type="title"/>
+          </p:nvPr>
+        </p:nvSpPr>
+        <p:spPr>
+          <a:xfrm>
+            <a:off x="0" y="0"/>
+            <a:ext cx="10515600" cy="1325563"/>
+          </a:xfrm>
+        </p:spPr>
+        <p:txBody>
+          <a:bodyPr>
+            <a:normAutofit/>
+          </a:bodyPr>
+          <a:lstStyle/>
+          <a:p>
+            <a:r>
+              <a:rPr lang="pt-BR" sz="3200" dirty="0"/>
+              <a:t>OS DESAFIOS DO BIG DATA PARA O PROFISSIONAL DA INFORMAÇÃO</a:t>
+            </a:r>
+          </a:p>
+        </p:txBody>
+      </p:sp>
+      <p:sp>
+        <p:nvSpPr>
+          <p:cNvPr id="3" name="Espaço Reservado para Conteúdo 2">
+            <a:extLst>
+              <a:ext uri="{FF2B5EF4-FFF2-40B4-BE49-F238E27FC236}">
+                <a16:creationId xmlns:a16="http://schemas.microsoft.com/office/drawing/2014/main" id="{2A494EE4-9EE8-49C5-AF91-47C5F8137F37}"/>
+              </a:ext>
+            </a:extLst>
+          </p:cNvPr>
+          <p:cNvSpPr>
+            <a:spLocks noGrp="1"/>
+          </p:cNvSpPr>
+          <p:nvPr>
+            <p:ph idx="1"/>
+          </p:nvPr>
+        </p:nvSpPr>
+        <p:spPr/>
+        <p:txBody>
+          <a:bodyPr/>
+          <a:lstStyle/>
+          <a:p>
+            <a:endParaRPr lang="pt-BR"/>
+          </a:p>
+        </p:txBody>
+      </p:sp>
+    </p:spTree>
+    <p:extLst>
+      <p:ext uri="{BB962C8B-B14F-4D97-AF65-F5344CB8AC3E}">
+        <p14:creationId xmlns:p14="http://schemas.microsoft.com/office/powerpoint/2010/main" val="2436176412"/>
+      </p:ext>
+    </p:extLst>
+  </p:cSld>
+  <p:clrMapOvr>
+    <a:masterClrMapping/>
+  </p:clrMapOvr>
+</p:sld>
+</file>
+
+<file path=ppt/slides/slide6.xml><?xml version="1.0" encoding="utf-8"?>
+<p:sld xmlns:a="http://schemas.openxmlformats.org/drawingml/2006/main" xmlns:r="http://schemas.openxmlformats.org/officeDocument/2006/relationships" xmlns:p="http://schemas.openxmlformats.org/presentationml/2006/main">
+  <p:cSld>
+    <p:spTree>
+      <p:nvGrpSpPr>
+        <p:cNvPr id="1" name=""/>
+        <p:cNvGrpSpPr/>
+        <p:nvPr/>
+      </p:nvGrpSpPr>
+      <p:grpSpPr>
+        <a:xfrm>
+          <a:off x="0" y="0"/>
+          <a:ext cx="0" cy="0"/>
+          <a:chOff x="0" y="0"/>
+          <a:chExt cx="0" cy="0"/>
+        </a:xfrm>
+      </p:grpSpPr>
+      <p:sp>
+        <p:nvSpPr>
+          <p:cNvPr id="2" name="Título 1">
+            <a:extLst>
+              <a:ext uri="{FF2B5EF4-FFF2-40B4-BE49-F238E27FC236}">
+                <a16:creationId xmlns:a16="http://schemas.microsoft.com/office/drawing/2014/main" id="{C59BEFC8-2DD9-458E-84C7-5184D50EF6A6}"/>
+              </a:ext>
+            </a:extLst>
+          </p:cNvPr>
+          <p:cNvSpPr>
+            <a:spLocks noGrp="1"/>
+          </p:cNvSpPr>
+          <p:nvPr>
+            <p:ph type="title"/>
+          </p:nvPr>
+        </p:nvSpPr>
+        <p:spPr>
+          <a:xfrm>
+            <a:off x="0" y="0"/>
+            <a:ext cx="10515600" cy="1325563"/>
+          </a:xfrm>
+        </p:spPr>
+        <p:txBody>
+          <a:bodyPr>
+            <a:normAutofit/>
+          </a:bodyPr>
+          <a:lstStyle/>
+          <a:p>
+            <a:r>
+              <a:rPr lang="pt-BR" sz="3200" dirty="0"/>
+              <a:t>REFERÊNCIAS BIBLIOGRÁFICAS</a:t>
+            </a:r>
+          </a:p>
+        </p:txBody>
+      </p:sp>
+      <p:sp>
+        <p:nvSpPr>
+          <p:cNvPr id="3" name="Espaço Reservado para Conteúdo 2">
+            <a:extLst>
+              <a:ext uri="{FF2B5EF4-FFF2-40B4-BE49-F238E27FC236}">
+                <a16:creationId xmlns:a16="http://schemas.microsoft.com/office/drawing/2014/main" id="{8E6890DC-06C3-4537-9951-36506813F544}"/>
+              </a:ext>
+            </a:extLst>
+          </p:cNvPr>
+          <p:cNvSpPr>
+            <a:spLocks noGrp="1"/>
+          </p:cNvSpPr>
+          <p:nvPr>
+            <p:ph idx="1"/>
+          </p:nvPr>
+        </p:nvSpPr>
+        <p:spPr>
+          <a:xfrm>
+            <a:off x="0" y="1176270"/>
+            <a:ext cx="8782878" cy="2083766"/>
+          </a:xfrm>
+        </p:spPr>
+        <p:txBody>
+          <a:bodyPr/>
+          <a:lstStyle/>
+          <a:p>
+            <a:r>
+              <a:rPr lang="pt-BR" sz="2000" dirty="0">
                 <a:solidFill>
                   <a:schemeClr val="accent1">
                     <a:lumMod val="50000"/>
                   </a:schemeClr>
                 </a:solidFill>
               </a:rPr>
+              <a:t>Freitas, </a:t>
+            </a:r>
+            <a:r>
+              <a:rPr lang="pt-BR" sz="2000" dirty="0" err="1">
+                <a:solidFill>
+                  <a:schemeClr val="accent1">
+                    <a:lumMod val="50000"/>
+                  </a:schemeClr>
+                </a:solidFill>
+              </a:rPr>
+              <a:t>Edvaldo.O</a:t>
+            </a:r>
+            <a:r>
+              <a:rPr lang="pt-BR" sz="2000" dirty="0">
+                <a:solidFill>
+                  <a:schemeClr val="accent1">
+                    <a:lumMod val="50000"/>
+                  </a:schemeClr>
+                </a:solidFill>
+              </a:rPr>
+              <a:t> que faz um desenvolvedor de TI? Conheça a profissão e saiba qual a sua importância. </a:t>
+            </a:r>
+            <a:r>
+              <a:rPr lang="pt-BR" sz="2000" dirty="0" err="1">
+                <a:solidFill>
+                  <a:schemeClr val="accent1">
+                    <a:lumMod val="50000"/>
+                  </a:schemeClr>
+                </a:solidFill>
+              </a:rPr>
+              <a:t>EZdevs</a:t>
+            </a:r>
+            <a:r>
+              <a:rPr lang="pt-BR" sz="2000" dirty="0">
+                <a:solidFill>
+                  <a:schemeClr val="accent1">
+                    <a:lumMod val="50000"/>
+                  </a:schemeClr>
+                </a:solidFill>
+              </a:rPr>
+              <a:t>, 22, junho.2020. Disponível em: https://ezdevs.com.br/o-que-faz-um-desenvolvedor-de-ti-conheca-a-profissao-e-saiba-qual-a-sua-importancia/#:~:text=O%20desenvolvedor%20de%20TI%20%C3%A9,ou%20software%20para%20empresas%20f%C3%ADsicas.. Acesso em: 2022-02-04.</a:t>
+            </a:r>
+          </a:p>
+        </p:txBody>
+      </p:sp>
+    </p:spTree>
+    <p:extLst>
+      <p:ext uri="{BB962C8B-B14F-4D97-AF65-F5344CB8AC3E}">
+        <p14:creationId xmlns:p14="http://schemas.microsoft.com/office/powerpoint/2010/main" val="1120027171"/>
+      </p:ext>
+    </p:extLst>
+  </p:cSld>
+  <p:clrMapOvr>
+    <a:masterClrMapping/>
+  </p:clrMapOvr>
+</p:sld>
+</file>
+
+<file path=ppt/slides/slide7.xml><?xml version="1.0" encoding="utf-8"?>
+<p:sld xmlns:a="http://schemas.openxmlformats.org/drawingml/2006/main" xmlns:r="http://schemas.openxmlformats.org/officeDocument/2006/relationships" xmlns:p="http://schemas.openxmlformats.org/presentationml/2006/main">
+  <p:cSld>
+    <p:spTree>
+      <p:nvGrpSpPr>
+        <p:cNvPr id="1" name=""/>
+        <p:cNvGrpSpPr/>
+        <p:nvPr/>
+      </p:nvGrpSpPr>
+      <p:grpSpPr>
+        <a:xfrm>
+          <a:off x="0" y="0"/>
+          <a:ext cx="0" cy="0"/>
+          <a:chOff x="0" y="0"/>
+          <a:chExt cx="0" cy="0"/>
+        </a:xfrm>
+      </p:grpSpPr>
+      <p:sp>
+        <p:nvSpPr>
+          <p:cNvPr id="2" name="Título 1">
+            <a:extLst>
+              <a:ext uri="{FF2B5EF4-FFF2-40B4-BE49-F238E27FC236}">
+                <a16:creationId xmlns:a16="http://schemas.microsoft.com/office/drawing/2014/main" id="{8948CA21-0D4B-4A10-BB70-7E2F0A9B4055}"/>
+              </a:ext>
+            </a:extLst>
+          </p:cNvPr>
+          <p:cNvSpPr>
+            <a:spLocks noGrp="1"/>
+          </p:cNvSpPr>
+          <p:nvPr>
+            <p:ph type="title"/>
+          </p:nvPr>
+        </p:nvSpPr>
+        <p:spPr>
+          <a:xfrm>
+            <a:off x="0" y="6627"/>
+            <a:ext cx="2703443" cy="888070"/>
+          </a:xfrm>
+        </p:spPr>
+        <p:txBody>
+          <a:bodyPr>
+            <a:normAutofit/>
+          </a:bodyPr>
+          <a:lstStyle/>
+          <a:p>
+            <a:r>
+              <a:rPr lang="pt-BR" dirty="0"/>
               <a:t>About us</a:t>
             </a:r>
           </a:p>

</xml_diff>